<commit_message>
adding week 8 assignments
</commit_message>
<xml_diff>
--- a/restful-api-presentations/phillips-presentation-week-8.pptx
+++ b/restful-api-presentations/phillips-presentation-week-8.pptx
@@ -17,8 +17,8 @@
     <p:sldId id="287" r:id="rId8"/>
     <p:sldId id="288" r:id="rId9"/>
     <p:sldId id="279" r:id="rId10"/>
-    <p:sldId id="286" r:id="rId11"/>
-    <p:sldId id="284" r:id="rId12"/>
+    <p:sldId id="284" r:id="rId11"/>
+    <p:sldId id="286" r:id="rId12"/>
     <p:sldId id="285" r:id="rId13"/>
     <p:sldId id="282" r:id="rId14"/>
   </p:sldIdLst>
@@ -134,8 +134,8 @@
             <p14:sldId id="287"/>
             <p14:sldId id="288"/>
             <p14:sldId id="279"/>
+            <p14:sldId id="284"/>
             <p14:sldId id="286"/>
-            <p14:sldId id="284"/>
             <p14:sldId id="285"/>
           </p14:sldIdLst>
         </p14:section>
@@ -2559,7 +2559,7 @@
         </p:spPr>
         <p:txBody>
           <a:bodyPr>
-            <a:normAutofit fontScale="92500" lnSpcReduction="10000"/>
+            <a:normAutofit/>
           </a:bodyPr>
           <a:lstStyle/>
           <a:p>
@@ -2576,60 +2576,42 @@
             </a:pPr>
             <a:r>
               <a:rPr lang="en-US" sz="1100" dirty="0" err="1"/>
-              <a:t>SarthakGarg</a:t>
+              <a:t>skelia</a:t>
             </a:r>
             <a:r>
               <a:rPr lang="en-US" sz="1100" dirty="0"/>
-              <a:t>. (</a:t>
+              <a:t>. (2018, March 2). 5 MAJOR BENEFITS OF MICROSERVICE ARCHITECTURE. Retrieved November 26, 2019, </a:t>
+            </a:r>
+          </a:p>
+          <a:p>
+            <a:pPr>
+              <a:lnSpc>
+                <a:spcPct val="100000"/>
+              </a:lnSpc>
+              <a:spcBef>
+                <a:spcPts val="0"/>
+              </a:spcBef>
+              <a:spcAft>
+                <a:spcPts val="0"/>
+              </a:spcAft>
+            </a:pPr>
+            <a:r>
+              <a:rPr lang="en-US" sz="1100" dirty="0"/>
+              <a:t>     from </a:t>
             </a:r>
             <a:r>
               <a:rPr lang="en-US" sz="1100" dirty="0" err="1"/>
-              <a:t>n.d.</a:t>
+              <a:t>skelia</a:t>
             </a:r>
             <a:r>
               <a:rPr lang="en-US" sz="1100" dirty="0"/>
-              <a:t>). Service-Oriented Architecture. Retrieved November 26, 2019, from Geeks </a:t>
-            </a:r>
-            <a:r>
-              <a:rPr lang="en-US" sz="1100" dirty="0" smtClean="0"/>
-              <a:t> </a:t>
-            </a:r>
-          </a:p>
-          <a:p>
-            <a:pPr>
-              <a:lnSpc>
-                <a:spcPct val="100000"/>
-              </a:lnSpc>
-              <a:spcBef>
-                <a:spcPts val="0"/>
-              </a:spcBef>
-              <a:spcAft>
-                <a:spcPts val="0"/>
-              </a:spcAft>
-            </a:pPr>
-            <a:r>
-              <a:rPr lang="en-US" sz="1100" dirty="0"/>
-              <a:t> </a:t>
-            </a:r>
-            <a:r>
-              <a:rPr lang="en-US" sz="1100" dirty="0" smtClean="0"/>
-              <a:t>    For Geeks </a:t>
-            </a:r>
-            <a:r>
-              <a:rPr lang="en-US" sz="1100" dirty="0"/>
-              <a:t>website: </a:t>
-            </a:r>
-            <a:r>
-              <a:rPr lang="en-US" sz="1100" dirty="0" smtClean="0">
-                <a:hlinkClick r:id="rId3"/>
-              </a:rPr>
-              <a:t>https</a:t>
+              <a:t> website: </a:t>
             </a:r>
             <a:r>
               <a:rPr lang="en-US" sz="1100" dirty="0">
                 <a:hlinkClick r:id="rId3"/>
               </a:rPr>
-              <a:t>://www.geeksforgeeks.org/service-oriented-architecture</a:t>
+              <a:t>https://skelia.com/articles/5-major-benefits-microservice-architecture</a:t>
             </a:r>
             <a:r>
               <a:rPr lang="en-US" sz="1100" dirty="0" smtClean="0">
@@ -2651,6 +2633,10 @@
                 <a:spcPts val="0"/>
               </a:spcAft>
             </a:pPr>
+            <a:r>
+              <a:rPr lang="en-US" sz="1100" dirty="0"/>
+              <a:t> </a:t>
+            </a:r>
             <a:endParaRPr lang="en-US" sz="1100" dirty="0" smtClean="0"/>
           </a:p>
           <a:p>
@@ -2667,98 +2653,11 @@
             </a:pPr>
             <a:r>
               <a:rPr lang="en-US" sz="1100" dirty="0" err="1" smtClean="0"/>
-              <a:t>Mulesoft</a:t>
+              <a:t>Wittmer</a:t>
             </a:r>
             <a:r>
               <a:rPr lang="en-US" sz="1100" dirty="0"/>
-              <a:t>. (</a:t>
-            </a:r>
-            <a:r>
-              <a:rPr lang="en-US" sz="1100" dirty="0" err="1"/>
-              <a:t>n.d.</a:t>
-            </a:r>
-            <a:r>
-              <a:rPr lang="en-US" sz="1100" dirty="0"/>
-              <a:t>). What is an ESB? Retrieved November 26, 2019, from </a:t>
-            </a:r>
-            <a:r>
-              <a:rPr lang="en-US" sz="1100" dirty="0" err="1"/>
-              <a:t>Mulesoft</a:t>
-            </a:r>
-            <a:r>
-              <a:rPr lang="en-US" sz="1100" dirty="0"/>
-              <a:t> website: </a:t>
-            </a:r>
-          </a:p>
-          <a:p>
-            <a:pPr>
-              <a:lnSpc>
-                <a:spcPct val="100000"/>
-              </a:lnSpc>
-              <a:spcBef>
-                <a:spcPts val="0"/>
-              </a:spcBef>
-              <a:spcAft>
-                <a:spcPts val="0"/>
-              </a:spcAft>
-            </a:pPr>
-            <a:r>
-              <a:rPr lang="en-US" sz="1100" dirty="0"/>
-              <a:t>    </a:t>
-            </a:r>
-            <a:r>
-              <a:rPr lang="en-US" sz="1100" dirty="0" smtClean="0">
-                <a:hlinkClick r:id="rId4"/>
-              </a:rPr>
-              <a:t>https</a:t>
-            </a:r>
-            <a:r>
-              <a:rPr lang="en-US" sz="1100" dirty="0">
-                <a:hlinkClick r:id="rId4"/>
-              </a:rPr>
-              <a:t>://</a:t>
-            </a:r>
-            <a:r>
-              <a:rPr lang="en-US" sz="1100" dirty="0" smtClean="0">
-                <a:hlinkClick r:id="rId4"/>
-              </a:rPr>
-              <a:t>www.mulesoft.com/resources/esb/what-esb</a:t>
-            </a:r>
-            <a:endParaRPr lang="en-US" sz="1100" dirty="0" smtClean="0"/>
-          </a:p>
-          <a:p>
-            <a:pPr>
-              <a:lnSpc>
-                <a:spcPct val="100000"/>
-              </a:lnSpc>
-              <a:spcBef>
-                <a:spcPts val="0"/>
-              </a:spcBef>
-              <a:spcAft>
-                <a:spcPts val="0"/>
-              </a:spcAft>
-            </a:pPr>
-            <a:endParaRPr lang="en-US" sz="1100" dirty="0" smtClean="0"/>
-          </a:p>
-          <a:p>
-            <a:pPr>
-              <a:lnSpc>
-                <a:spcPct val="100000"/>
-              </a:lnSpc>
-              <a:spcBef>
-                <a:spcPts val="0"/>
-              </a:spcBef>
-              <a:spcAft>
-                <a:spcPts val="0"/>
-              </a:spcAft>
-            </a:pPr>
-            <a:r>
-              <a:rPr lang="en-US" sz="1100" dirty="0" smtClean="0"/>
-              <a:t>Pearlman</a:t>
-            </a:r>
-            <a:r>
-              <a:rPr lang="en-US" sz="1100" dirty="0"/>
-              <a:t>, S. (2016, October 3). Enterprise Service Bus vs Traditional SOA. Retrieved November 26, </a:t>
+              <a:t>, P. (2019, July 4). Advantages and Disadvantages of Microservices. Retrieved November 26, </a:t>
             </a:r>
           </a:p>
           <a:p>
@@ -2779,12 +2678,50 @@
             </a:r>
             <a:r>
               <a:rPr lang="en-US" sz="1100" dirty="0" err="1"/>
-              <a:t>Mulesoft</a:t>
+              <a:t>tiempodev</a:t>
             </a:r>
             <a:r>
               <a:rPr lang="en-US" sz="1100" dirty="0"/>
-              <a:t> website: https://blogs.mulesoft.com/dev/connectivity-dev/esb-vs-soa/ </a:t>
-            </a:r>
+              <a:t> website: https://www.tiempodev.com/blog/ </a:t>
+            </a:r>
+          </a:p>
+          <a:p>
+            <a:pPr>
+              <a:lnSpc>
+                <a:spcPct val="100000"/>
+              </a:lnSpc>
+              <a:spcBef>
+                <a:spcPts val="0"/>
+              </a:spcBef>
+              <a:spcAft>
+                <a:spcPts val="0"/>
+              </a:spcAft>
+            </a:pPr>
+            <a:r>
+              <a:rPr lang="en-US" sz="1100" dirty="0"/>
+              <a:t>     disadvantages-of-a-</a:t>
+            </a:r>
+            <a:r>
+              <a:rPr lang="en-US" sz="1100" dirty="0" err="1"/>
+              <a:t>microservices</a:t>
+            </a:r>
+            <a:r>
+              <a:rPr lang="en-US" sz="1100" dirty="0"/>
+              <a:t>-architecture/ </a:t>
+            </a:r>
+          </a:p>
+          <a:p>
+            <a:pPr>
+              <a:lnSpc>
+                <a:spcPct val="100000"/>
+              </a:lnSpc>
+              <a:spcBef>
+                <a:spcPts val="0"/>
+              </a:spcBef>
+              <a:spcAft>
+                <a:spcPts val="0"/>
+              </a:spcAft>
+            </a:pPr>
             <a:endParaRPr lang="en-US" sz="1100" dirty="0" smtClean="0"/>
           </a:p>
           <a:p>
@@ -2799,7 +2736,10 @@
                 <a:spcPts val="0"/>
               </a:spcAft>
             </a:pPr>
-            <a:endParaRPr lang="en-US" sz="1100" dirty="0" smtClean="0"/>
+            <a:r>
+              <a:rPr lang="en-US" sz="1100" dirty="0"/>
+              <a:t>Torre, J. L. (2018, April 11). Microservices: The Good, the Bad, and the Ugly. Retrieved November </a:t>
+            </a:r>
           </a:p>
           <a:p>
             <a:pPr>
@@ -2814,358 +2754,16 @@
               </a:spcAft>
             </a:pPr>
             <a:r>
-              <a:rPr lang="en-US" sz="1100" dirty="0" err="1" smtClean="0"/>
-              <a:t>innovativearchitects</a:t>
-            </a:r>
-            <a:r>
               <a:rPr lang="en-US" sz="1100" dirty="0"/>
-              <a:t>. (</a:t>
+              <a:t>     26, 2019, from </a:t>
             </a:r>
             <a:r>
               <a:rPr lang="en-US" sz="1100" dirty="0" err="1"/>
-              <a:t>n.d.</a:t>
+              <a:t>dzone</a:t>
             </a:r>
             <a:r>
               <a:rPr lang="en-US" sz="1100" dirty="0"/>
-              <a:t>). Key Differences between ESB, EAI and SOA. Retrieved November 26, 2019, </a:t>
-            </a:r>
-          </a:p>
-          <a:p>
-            <a:pPr>
-              <a:lnSpc>
-                <a:spcPct val="100000"/>
-              </a:lnSpc>
-              <a:spcBef>
-                <a:spcPts val="0"/>
-              </a:spcBef>
-              <a:spcAft>
-                <a:spcPts val="0"/>
-              </a:spcAft>
-            </a:pPr>
-            <a:r>
-              <a:rPr lang="en-US" sz="1100" dirty="0"/>
-              <a:t>     from </a:t>
-            </a:r>
-            <a:r>
-              <a:rPr lang="en-US" sz="1100" dirty="0" err="1"/>
-              <a:t>innovativearchitects</a:t>
-            </a:r>
-            <a:r>
-              <a:rPr lang="en-US" sz="1100" dirty="0"/>
-              <a:t> website: https://www.innovativearchitects.com/KnowledgeCenter/ </a:t>
-            </a:r>
-          </a:p>
-          <a:p>
-            <a:pPr>
-              <a:lnSpc>
-                <a:spcPct val="100000"/>
-              </a:lnSpc>
-              <a:spcBef>
-                <a:spcPts val="0"/>
-              </a:spcBef>
-              <a:spcAft>
-                <a:spcPts val="0"/>
-              </a:spcAft>
-            </a:pPr>
-            <a:r>
-              <a:rPr lang="en-US" sz="1100" dirty="0"/>
-              <a:t>     business-connectivity/ESB-EAI-SOA.aspx </a:t>
-            </a:r>
-            <a:endParaRPr lang="en-US" sz="1100" dirty="0" smtClean="0"/>
-          </a:p>
-          <a:p>
-            <a:pPr>
-              <a:lnSpc>
-                <a:spcPct val="100000"/>
-              </a:lnSpc>
-              <a:spcBef>
-                <a:spcPts val="0"/>
-              </a:spcBef>
-              <a:spcAft>
-                <a:spcPts val="0"/>
-              </a:spcAft>
-            </a:pPr>
-            <a:endParaRPr lang="en-US" sz="1100" dirty="0" smtClean="0"/>
-          </a:p>
-          <a:p>
-            <a:pPr>
-              <a:lnSpc>
-                <a:spcPct val="100000"/>
-              </a:lnSpc>
-              <a:spcBef>
-                <a:spcPts val="0"/>
-              </a:spcBef>
-              <a:spcAft>
-                <a:spcPts val="0"/>
-              </a:spcAft>
-            </a:pPr>
-            <a:r>
-              <a:rPr lang="en-US" sz="1100" dirty="0" smtClean="0"/>
-              <a:t>Hughes</a:t>
-            </a:r>
-            <a:r>
-              <a:rPr lang="en-US" sz="1100" dirty="0"/>
-              <a:t>, A. (2018, June 5). The Ins and Outs of a Service-Oriented Architecture (SOA). Retrieved </a:t>
-            </a:r>
-          </a:p>
-          <a:p>
-            <a:pPr>
-              <a:lnSpc>
-                <a:spcPct val="100000"/>
-              </a:lnSpc>
-              <a:spcBef>
-                <a:spcPts val="0"/>
-              </a:spcBef>
-              <a:spcAft>
-                <a:spcPts val="0"/>
-              </a:spcAft>
-            </a:pPr>
-            <a:r>
-              <a:rPr lang="en-US" sz="1100" dirty="0"/>
-              <a:t>     November 26, 2019, from </a:t>
-            </a:r>
-            <a:r>
-              <a:rPr lang="en-US" sz="1100" dirty="0" err="1"/>
-              <a:t>cleo</a:t>
-            </a:r>
-            <a:r>
-              <a:rPr lang="en-US" sz="1100" dirty="0"/>
-              <a:t> website: https://www.cleo.com/blog/ </a:t>
-            </a:r>
-          </a:p>
-          <a:p>
-            <a:pPr>
-              <a:lnSpc>
-                <a:spcPct val="100000"/>
-              </a:lnSpc>
-              <a:spcBef>
-                <a:spcPts val="0"/>
-              </a:spcBef>
-              <a:spcAft>
-                <a:spcPts val="0"/>
-              </a:spcAft>
-            </a:pPr>
-            <a:r>
-              <a:rPr lang="en-US" sz="1100" dirty="0"/>
-              <a:t>     knowledge-base-</a:t>
-            </a:r>
-            <a:r>
-              <a:rPr lang="en-US" sz="1100" dirty="0" err="1"/>
-              <a:t>soa</a:t>
-            </a:r>
-            <a:r>
-              <a:rPr lang="en-US" sz="1100" dirty="0"/>
-              <a:t>-service-oriented-architecture </a:t>
-            </a:r>
-            <a:endParaRPr lang="en-US" sz="1100" dirty="0" smtClean="0"/>
-          </a:p>
-          <a:p>
-            <a:pPr>
-              <a:lnSpc>
-                <a:spcPct val="100000"/>
-              </a:lnSpc>
-              <a:spcBef>
-                <a:spcPts val="0"/>
-              </a:spcBef>
-              <a:spcAft>
-                <a:spcPts val="0"/>
-              </a:spcAft>
-            </a:pPr>
-            <a:endParaRPr lang="en-US" sz="1100" dirty="0" smtClean="0">
-              <a:hlinkClick r:id="rId5"/>
-            </a:endParaRPr>
-          </a:p>
-          <a:p>
-            <a:pPr>
-              <a:lnSpc>
-                <a:spcPct val="100000"/>
-              </a:lnSpc>
-              <a:spcBef>
-                <a:spcPts val="0"/>
-              </a:spcBef>
-              <a:spcAft>
-                <a:spcPts val="0"/>
-              </a:spcAft>
-            </a:pPr>
-            <a:r>
-              <a:rPr lang="en-US" sz="1100" dirty="0" err="1"/>
-              <a:t>Rehman</a:t>
-            </a:r>
-            <a:r>
-              <a:rPr lang="en-US" sz="1100" dirty="0"/>
-              <a:t>, J. (</a:t>
-            </a:r>
-            <a:r>
-              <a:rPr lang="en-US" sz="1100" dirty="0" err="1"/>
-              <a:t>n.d.</a:t>
-            </a:r>
-            <a:r>
-              <a:rPr lang="en-US" sz="1100" dirty="0"/>
-              <a:t>). Advantages and disadvantages of service oriented architecture (SOA). Retrieved </a:t>
-            </a:r>
-          </a:p>
-          <a:p>
-            <a:pPr>
-              <a:lnSpc>
-                <a:spcPct val="100000"/>
-              </a:lnSpc>
-              <a:spcBef>
-                <a:spcPts val="0"/>
-              </a:spcBef>
-              <a:spcAft>
-                <a:spcPts val="0"/>
-              </a:spcAft>
-            </a:pPr>
-            <a:r>
-              <a:rPr lang="en-US" sz="1100" dirty="0"/>
-              <a:t>     November 26, 2019, from </a:t>
-            </a:r>
-            <a:r>
-              <a:rPr lang="en-US" sz="1100" dirty="0" err="1"/>
-              <a:t>itrelease</a:t>
-            </a:r>
-            <a:r>
-              <a:rPr lang="en-US" sz="1100" dirty="0"/>
-              <a:t> website: http://www.itrelease.com/2018/10/ </a:t>
-            </a:r>
-          </a:p>
-          <a:p>
-            <a:pPr>
-              <a:lnSpc>
-                <a:spcPct val="100000"/>
-              </a:lnSpc>
-              <a:spcBef>
-                <a:spcPts val="0"/>
-              </a:spcBef>
-              <a:spcAft>
-                <a:spcPts val="0"/>
-              </a:spcAft>
-            </a:pPr>
-            <a:r>
-              <a:rPr lang="en-US" sz="1100" dirty="0"/>
-              <a:t>     advantages-and-disadvantages-of-service-oriented-architecture-soa/ </a:t>
-            </a:r>
-            <a:endParaRPr lang="en-US" sz="1100" dirty="0" smtClean="0"/>
-          </a:p>
-          <a:p>
-            <a:pPr>
-              <a:lnSpc>
-                <a:spcPct val="100000"/>
-              </a:lnSpc>
-              <a:spcBef>
-                <a:spcPts val="0"/>
-              </a:spcBef>
-              <a:spcAft>
-                <a:spcPts val="0"/>
-              </a:spcAft>
-            </a:pPr>
-            <a:endParaRPr lang="en-US" sz="1100" dirty="0"/>
-          </a:p>
-          <a:p>
-            <a:pPr>
-              <a:lnSpc>
-                <a:spcPct val="100000"/>
-              </a:lnSpc>
-              <a:spcBef>
-                <a:spcPts val="0"/>
-              </a:spcBef>
-              <a:spcAft>
-                <a:spcPts val="0"/>
-              </a:spcAft>
-            </a:pPr>
-            <a:r>
-              <a:rPr lang="en-US" sz="1100" dirty="0" err="1" smtClean="0"/>
-              <a:t>Takale</a:t>
-            </a:r>
-            <a:r>
-              <a:rPr lang="en-US" sz="1100" dirty="0"/>
-              <a:t>, S. (2018, April 9). Advantages and Disadvantages of Service-oriented Architecture (SOA). </a:t>
-            </a:r>
-          </a:p>
-          <a:p>
-            <a:pPr>
-              <a:lnSpc>
-                <a:spcPct val="100000"/>
-              </a:lnSpc>
-              <a:spcBef>
-                <a:spcPts val="0"/>
-              </a:spcBef>
-              <a:spcAft>
-                <a:spcPts val="0"/>
-              </a:spcAft>
-            </a:pPr>
-            <a:r>
-              <a:rPr lang="en-US" sz="1100" dirty="0"/>
-              <a:t>     Retrieved November 26, 2019, from </a:t>
-            </a:r>
-            <a:r>
-              <a:rPr lang="en-US" sz="1100" dirty="0" err="1"/>
-              <a:t>techspirited</a:t>
-            </a:r>
-            <a:r>
-              <a:rPr lang="en-US" sz="1100" dirty="0"/>
-              <a:t> website: https://techspirited.com/ </a:t>
-            </a:r>
-          </a:p>
-          <a:p>
-            <a:pPr>
-              <a:lnSpc>
-                <a:spcPct val="100000"/>
-              </a:lnSpc>
-              <a:spcBef>
-                <a:spcPts val="0"/>
-              </a:spcBef>
-              <a:spcAft>
-                <a:spcPts val="0"/>
-              </a:spcAft>
-            </a:pPr>
-            <a:r>
-              <a:rPr lang="en-US" sz="1100" dirty="0"/>
-              <a:t>     advantages-disadvantages-of-service-oriented-architecture-</a:t>
-            </a:r>
-            <a:r>
-              <a:rPr lang="en-US" sz="1100" dirty="0" err="1"/>
-              <a:t>soa</a:t>
-            </a:r>
-            <a:r>
-              <a:rPr lang="en-US" sz="1100" dirty="0"/>
-              <a:t> </a:t>
-            </a:r>
-            <a:endParaRPr lang="en-US" sz="1100" dirty="0" smtClean="0"/>
-          </a:p>
-          <a:p>
-            <a:pPr>
-              <a:lnSpc>
-                <a:spcPct val="100000"/>
-              </a:lnSpc>
-              <a:spcBef>
-                <a:spcPts val="0"/>
-              </a:spcBef>
-              <a:spcAft>
-                <a:spcPts val="0"/>
-              </a:spcAft>
-            </a:pPr>
-            <a:endParaRPr lang="en-US" sz="1100" dirty="0"/>
-          </a:p>
-          <a:p>
-            <a:pPr>
-              <a:lnSpc>
-                <a:spcPct val="100000"/>
-              </a:lnSpc>
-              <a:spcBef>
-                <a:spcPts val="0"/>
-              </a:spcBef>
-              <a:spcAft>
-                <a:spcPts val="0"/>
-              </a:spcAft>
-            </a:pPr>
-            <a:r>
-              <a:rPr lang="en-US" sz="1100" dirty="0" err="1" smtClean="0"/>
-              <a:t>Bednarz</a:t>
-            </a:r>
-            <a:r>
-              <a:rPr lang="en-US" sz="1100" dirty="0"/>
-              <a:t>, A. (2006, November 14). The art of managing an SOA. Retrieved November 26, 2019, from </a:t>
+              <a:t> website: https://dzone.com/articles/ </a:t>
             </a:r>
           </a:p>
           <a:p>
@@ -3186,12 +2784,13 @@
             </a:r>
             <a:r>
               <a:rPr lang="en-US" sz="1100" dirty="0" err="1"/>
-              <a:t>networkworld</a:t>
+              <a:t>microservices</a:t>
             </a:r>
             <a:r>
               <a:rPr lang="en-US" sz="1100" dirty="0"/>
-              <a:t> website: https://www.networkworld.com/article/2301023/ </a:t>
-            </a:r>
+              <a:t>-the-good-the-bad-and-the-ugly </a:t>
+            </a:r>
+            <a:endParaRPr lang="en-US" sz="1100" dirty="0" smtClean="0"/>
           </a:p>
           <a:p>
             <a:pPr>
@@ -3205,9 +2804,81 @@
                 <a:spcPts val="0"/>
               </a:spcAft>
             </a:pPr>
+            <a:endParaRPr lang="en-US" sz="1100" dirty="0"/>
+          </a:p>
+          <a:p>
+            <a:pPr>
+              <a:lnSpc>
+                <a:spcPct val="100000"/>
+              </a:lnSpc>
+              <a:spcBef>
+                <a:spcPts val="0"/>
+              </a:spcBef>
+              <a:spcAft>
+                <a:spcPts val="0"/>
+              </a:spcAft>
+            </a:pPr>
             <a:r>
               <a:rPr lang="en-US" sz="1100" dirty="0"/>
-              <a:t>     the-art-of-managing-an-soa.html </a:t>
+              <a:t>Richardson, C. (2015, June 15). Building Microservices: Using an API Gateway. Retrieved November 26, </a:t>
+            </a:r>
+          </a:p>
+          <a:p>
+            <a:pPr>
+              <a:lnSpc>
+                <a:spcPct val="100000"/>
+              </a:lnSpc>
+              <a:spcBef>
+                <a:spcPts val="0"/>
+              </a:spcBef>
+              <a:spcAft>
+                <a:spcPts val="0"/>
+              </a:spcAft>
+            </a:pPr>
+            <a:r>
+              <a:rPr lang="en-US" sz="1100" dirty="0"/>
+              <a:t>     2019, from </a:t>
+            </a:r>
+            <a:r>
+              <a:rPr lang="en-US" sz="1100" dirty="0" err="1"/>
+              <a:t>nginx</a:t>
+            </a:r>
+            <a:r>
+              <a:rPr lang="en-US" sz="1100" dirty="0"/>
+              <a:t> website: https://www.nginx.com/blog/ </a:t>
+            </a:r>
+          </a:p>
+          <a:p>
+            <a:pPr>
+              <a:lnSpc>
+                <a:spcPct val="100000"/>
+              </a:lnSpc>
+              <a:spcBef>
+                <a:spcPts val="0"/>
+              </a:spcBef>
+              <a:spcAft>
+                <a:spcPts val="0"/>
+              </a:spcAft>
+            </a:pPr>
+            <a:r>
+              <a:rPr lang="en-US" sz="1100" dirty="0"/>
+              <a:t>     building-</a:t>
+            </a:r>
+            <a:r>
+              <a:rPr lang="en-US" sz="1100" dirty="0" err="1"/>
+              <a:t>microservices</a:t>
+            </a:r>
+            <a:r>
+              <a:rPr lang="en-US" sz="1100" dirty="0"/>
+              <a:t>-using-an-</a:t>
+            </a:r>
+            <a:r>
+              <a:rPr lang="en-US" sz="1100" dirty="0" err="1"/>
+              <a:t>api</a:t>
+            </a:r>
+            <a:r>
+              <a:rPr lang="en-US" sz="1100" dirty="0"/>
+              <a:t>-gateway/ </a:t>
             </a:r>
             <a:endParaRPr lang="en-US" sz="1100" dirty="0" smtClean="0"/>
           </a:p>
@@ -3223,9 +2894,49 @@
                 <a:spcPts val="0"/>
               </a:spcAft>
             </a:pPr>
-            <a:endParaRPr lang="en-US" sz="1100" dirty="0" smtClean="0">
-              <a:hlinkClick r:id="rId6"/>
-            </a:endParaRPr>
+            <a:endParaRPr lang="en-US" sz="1100" dirty="0"/>
+          </a:p>
+          <a:p>
+            <a:pPr>
+              <a:lnSpc>
+                <a:spcPct val="100000"/>
+              </a:lnSpc>
+              <a:spcBef>
+                <a:spcPts val="0"/>
+              </a:spcBef>
+              <a:spcAft>
+                <a:spcPts val="0"/>
+              </a:spcAft>
+            </a:pPr>
+            <a:r>
+              <a:rPr lang="en-US" sz="1100" dirty="0"/>
+              <a:t>U, D. (2015, August 8). What are </a:t>
+            </a:r>
+            <a:r>
+              <a:rPr lang="en-US" sz="1100" dirty="0" err="1"/>
+              <a:t>microservices</a:t>
+            </a:r>
+            <a:r>
+              <a:rPr lang="en-US" sz="1100" dirty="0"/>
+              <a:t>? [Video file]. Retrieved from https://youtu.be/ </a:t>
+            </a:r>
+          </a:p>
+          <a:p>
+            <a:pPr>
+              <a:lnSpc>
+                <a:spcPct val="100000"/>
+              </a:lnSpc>
+              <a:spcBef>
+                <a:spcPts val="0"/>
+              </a:spcBef>
+              <a:spcAft>
+                <a:spcPts val="0"/>
+              </a:spcAft>
+            </a:pPr>
+            <a:r>
+              <a:rPr lang="en-US" sz="1100" dirty="0"/>
+              <a:t>     PY9xSykods4 </a:t>
+            </a:r>
           </a:p>
         </p:txBody>
       </p:sp>
@@ -3533,21 +3244,16 @@
             </a:pPr>
             <a:r>
               <a:rPr lang="en-US" sz="1600" b="1" dirty="0" smtClean="0"/>
-              <a:t>What </a:t>
+              <a:t>What are </a:t>
             </a:r>
             <a:r>
               <a:rPr lang="en-US" sz="1600" b="1" dirty="0" smtClean="0"/>
-              <a:t>are </a:t>
-            </a:r>
-            <a:r>
-              <a:rPr lang="en-US" sz="1600" b="1" dirty="0" err="1" smtClean="0"/>
-              <a:t>microservices</a:t>
+              <a:t>Microservices</a:t>
             </a:r>
             <a:r>
               <a:rPr lang="en-US" sz="1600" b="1" dirty="0" smtClean="0"/>
               <a:t>?</a:t>
             </a:r>
-            <a:endParaRPr lang="en-US" sz="1600" b="1" dirty="0" smtClean="0"/>
           </a:p>
           <a:p>
             <a:pPr lvl="0">
@@ -3558,6 +3264,122 @@
               <a:buChar char="-"/>
               <a:defRPr/>
             </a:pPr>
+            <a:r>
+              <a:rPr lang="en-US" dirty="0" smtClean="0"/>
+              <a:t>A self contained process that provides a unique business capability</a:t>
+            </a:r>
+          </a:p>
+          <a:p>
+            <a:pPr lvl="0">
+              <a:spcAft>
+                <a:spcPts val="600"/>
+              </a:spcAft>
+              <a:buFontTx/>
+              <a:buChar char="-"/>
+              <a:defRPr/>
+            </a:pPr>
+            <a:r>
+              <a:rPr lang="en-US" dirty="0" smtClean="0"/>
+              <a:t>Different Microservices act as one larger system</a:t>
+            </a:r>
+          </a:p>
+          <a:p>
+            <a:pPr lvl="0">
+              <a:spcAft>
+                <a:spcPts val="600"/>
+              </a:spcAft>
+              <a:buFontTx/>
+              <a:buChar char="-"/>
+              <a:defRPr/>
+            </a:pPr>
+            <a:r>
+              <a:rPr lang="en-US" dirty="0" smtClean="0"/>
+              <a:t>In example:</a:t>
+            </a:r>
+          </a:p>
+          <a:p>
+            <a:pPr lvl="1">
+              <a:spcAft>
+                <a:spcPts val="600"/>
+              </a:spcAft>
+              <a:buFontTx/>
+              <a:buChar char="-"/>
+              <a:defRPr/>
+            </a:pPr>
+            <a:r>
+              <a:rPr lang="en-US" dirty="0" smtClean="0"/>
+              <a:t>An application may appear to be one large serve all function</a:t>
+            </a:r>
+          </a:p>
+          <a:p>
+            <a:pPr lvl="1">
+              <a:spcAft>
+                <a:spcPts val="600"/>
+              </a:spcAft>
+              <a:buFontTx/>
+              <a:buChar char="-"/>
+              <a:defRPr/>
+            </a:pPr>
+            <a:r>
+              <a:rPr lang="en-US" dirty="0" smtClean="0"/>
+              <a:t>But behind the scenes there may be many different services for</a:t>
+            </a:r>
+          </a:p>
+          <a:p>
+            <a:pPr lvl="2">
+              <a:spcAft>
+                <a:spcPts val="600"/>
+              </a:spcAft>
+              <a:buFontTx/>
+              <a:buChar char="-"/>
+              <a:defRPr/>
+            </a:pPr>
+            <a:r>
+              <a:rPr lang="en-US" dirty="0" smtClean="0"/>
+              <a:t>Employees</a:t>
+            </a:r>
+          </a:p>
+          <a:p>
+            <a:pPr lvl="2">
+              <a:spcAft>
+                <a:spcPts val="600"/>
+              </a:spcAft>
+              <a:buFontTx/>
+              <a:buChar char="-"/>
+              <a:defRPr/>
+            </a:pPr>
+            <a:r>
+              <a:rPr lang="en-US" dirty="0" smtClean="0"/>
+              <a:t>Orders</a:t>
+            </a:r>
+          </a:p>
+          <a:p>
+            <a:pPr lvl="2">
+              <a:spcAft>
+                <a:spcPts val="600"/>
+              </a:spcAft>
+              <a:buFontTx/>
+              <a:buChar char="-"/>
+              <a:defRPr/>
+            </a:pPr>
+            <a:r>
+              <a:rPr lang="en-US" dirty="0" smtClean="0"/>
+              <a:t>Processing</a:t>
+            </a:r>
+          </a:p>
+          <a:p>
+            <a:pPr lvl="2">
+              <a:spcAft>
+                <a:spcPts val="600"/>
+              </a:spcAft>
+              <a:buFontTx/>
+              <a:buChar char="-"/>
+              <a:defRPr/>
+            </a:pPr>
+            <a:r>
+              <a:rPr lang="en-US" dirty="0" smtClean="0"/>
+              <a:t>Work Orders</a:t>
+            </a:r>
             <a:endParaRPr lang="en-US" dirty="0"/>
           </a:p>
           <a:p>
@@ -3575,7 +3397,7 @@
       </p:sp>
       <p:pic>
         <p:nvPicPr>
-          <p:cNvPr id="2" name="Picture 1"/>
+          <p:cNvPr id="3" name="Picture 2"/>
           <p:cNvPicPr>
             <a:picLocks noChangeAspect="1"/>
           </p:cNvPicPr>
@@ -3595,8 +3417,8 @@
         </p:blipFill>
         <p:spPr>
           <a:xfrm>
-            <a:off x="7132077" y="1524708"/>
-            <a:ext cx="3983635" cy="3674853"/>
+            <a:off x="6096000" y="1524708"/>
+            <a:ext cx="4934309" cy="3700732"/>
           </a:xfrm>
           <a:prstGeom prst="rect">
             <a:avLst/>
@@ -3895,7 +3717,11 @@
             </a:r>
             <a:r>
               <a:rPr lang="en-US" b="1" dirty="0" smtClean="0"/>
-              <a:t>an API gateway?</a:t>
+              <a:t>an API gateway</a:t>
+            </a:r>
+            <a:r>
+              <a:rPr lang="en-US" b="1" dirty="0" smtClean="0"/>
+              <a:t>?</a:t>
             </a:r>
           </a:p>
           <a:p>
@@ -3903,7 +3729,87 @@
               <a:buFontTx/>
               <a:buChar char="-"/>
             </a:pPr>
-            <a:endParaRPr lang="en-US" b="1" cap="all" dirty="0"/>
+            <a:r>
+              <a:rPr lang="en-US" dirty="0" smtClean="0"/>
+              <a:t>An API gateway is a server that is the single entry point into the system</a:t>
+            </a:r>
+          </a:p>
+          <a:p>
+            <a:pPr fontAlgn="base">
+              <a:buFontTx/>
+              <a:buChar char="-"/>
+            </a:pPr>
+            <a:r>
+              <a:rPr lang="en-US" dirty="0" smtClean="0"/>
+              <a:t>The </a:t>
+            </a:r>
+            <a:r>
+              <a:rPr lang="en-US" dirty="0"/>
+              <a:t>API Gateway encapsulates the internal system architecture and provides an API that is tailored to each client</a:t>
+            </a:r>
+            <a:r>
+              <a:rPr lang="en-US" dirty="0" smtClean="0"/>
+              <a:t>.</a:t>
+            </a:r>
+          </a:p>
+          <a:p>
+            <a:pPr fontAlgn="base">
+              <a:buFontTx/>
+              <a:buChar char="-"/>
+            </a:pPr>
+            <a:r>
+              <a:rPr lang="en-US" dirty="0" smtClean="0"/>
+              <a:t>Has </a:t>
+            </a:r>
+            <a:r>
+              <a:rPr lang="en-US" dirty="0"/>
+              <a:t>responsibilities such as authentication, monitoring, load balancing, caching, request shaping and management, and static response handling</a:t>
+            </a:r>
+            <a:r>
+              <a:rPr lang="en-US" dirty="0" smtClean="0"/>
+              <a:t>.</a:t>
+            </a:r>
+          </a:p>
+          <a:p>
+            <a:pPr fontAlgn="base">
+              <a:buFontTx/>
+              <a:buChar char="-"/>
+            </a:pPr>
+            <a:r>
+              <a:rPr lang="en-US" dirty="0"/>
+              <a:t>API Gateway is responsible for request routing, composition, and protocol </a:t>
+            </a:r>
+            <a:r>
+              <a:rPr lang="en-US" dirty="0" smtClean="0"/>
+              <a:t>translation.</a:t>
+            </a:r>
+          </a:p>
+          <a:p>
+            <a:pPr fontAlgn="base">
+              <a:buFontTx/>
+              <a:buChar char="-"/>
+            </a:pPr>
+            <a:r>
+              <a:rPr lang="en-US" dirty="0"/>
+              <a:t>All requests from clients first go through the API </a:t>
+            </a:r>
+            <a:r>
+              <a:rPr lang="en-US" dirty="0" smtClean="0"/>
+              <a:t>Gateway, then are routed to </a:t>
+            </a:r>
+            <a:r>
+              <a:rPr lang="en-US" dirty="0"/>
+              <a:t>the appropriate </a:t>
+            </a:r>
+            <a:r>
+              <a:rPr lang="en-US" dirty="0" smtClean="0"/>
+              <a:t>micro service.</a:t>
+            </a:r>
+            <a:r>
+              <a:rPr lang="en-US" dirty="0"/>
+              <a:t> </a:t>
+            </a:r>
+            <a:endParaRPr lang="en-US" dirty="0" smtClean="0"/>
           </a:p>
         </p:txBody>
       </p:sp>
@@ -3984,7 +3890,7 @@
         <p:spPr>
           <a:xfrm>
             <a:off x="541609" y="1455491"/>
-            <a:ext cx="6856717" cy="4971188"/>
+            <a:ext cx="11060919" cy="4971188"/>
           </a:xfrm>
           <a:prstGeom prst="rect">
             <a:avLst/>
@@ -4201,7 +4107,6 @@
               <a:rPr lang="en-US" b="1" dirty="0"/>
               <a:t>advantages of Microservices?</a:t>
             </a:r>
-            <a:endParaRPr lang="en-US" b="1" dirty="0"/>
           </a:p>
           <a:p>
             <a:pPr>
@@ -4212,10 +4117,150 @@
               <a:buChar char="-"/>
             </a:pPr>
             <a:r>
+              <a:rPr lang="en-US" dirty="0"/>
+              <a:t>Improved Productivity and </a:t>
+            </a:r>
+            <a:r>
               <a:rPr lang="en-US" dirty="0" smtClean="0"/>
-              <a:t> </a:t>
-            </a:r>
-            <a:endParaRPr lang="en-US" dirty="0"/>
+              <a:t>Speed - </a:t>
+            </a:r>
+            <a:r>
+              <a:rPr lang="en-US" dirty="0" err="1"/>
+              <a:t>microservices</a:t>
+            </a:r>
+            <a:r>
+              <a:rPr lang="en-US" dirty="0"/>
+              <a:t> architecture tackles the problem of productivity and speed by decomposing applications into manageable services that are faster to develop</a:t>
+            </a:r>
+          </a:p>
+          <a:p>
+            <a:pPr>
+              <a:spcAft>
+                <a:spcPts val="2000"/>
+              </a:spcAft>
+              <a:buFontTx/>
+              <a:buChar char="-"/>
+            </a:pPr>
+            <a:r>
+              <a:rPr lang="en-US" dirty="0"/>
+              <a:t>Flexibility in Using Technologies and </a:t>
+            </a:r>
+            <a:r>
+              <a:rPr lang="en-US" dirty="0" smtClean="0"/>
+              <a:t>Scalability – having the ability to write each service in a different tech </a:t>
+            </a:r>
+            <a:r>
+              <a:rPr lang="en-US" dirty="0"/>
+              <a:t>simplifies the selection of the most appropriate tech stack for the specific needs of your service.</a:t>
+            </a:r>
+          </a:p>
+          <a:p>
+            <a:pPr>
+              <a:spcAft>
+                <a:spcPts val="2000"/>
+              </a:spcAft>
+              <a:buFontTx/>
+              <a:buChar char="-"/>
+            </a:pPr>
+            <a:r>
+              <a:rPr lang="en-US" dirty="0"/>
+              <a:t>Autonomous, Cross-functional </a:t>
+            </a:r>
+            <a:r>
+              <a:rPr lang="en-US" dirty="0" smtClean="0"/>
+              <a:t>Teams -</a:t>
+            </a:r>
+            <a:r>
+              <a:rPr lang="en-US" dirty="0"/>
+              <a:t> </a:t>
+            </a:r>
+            <a:r>
+              <a:rPr lang="en-US" dirty="0" smtClean="0"/>
+              <a:t>carrying </a:t>
+            </a:r>
+            <a:r>
+              <a:rPr lang="en-US" dirty="0"/>
+              <a:t>out the development of a massive monolith system can be complicated and messy if you’re working with divisions around the globe or extended teams.</a:t>
+            </a:r>
+          </a:p>
+          <a:p>
+            <a:pPr>
+              <a:spcAft>
+                <a:spcPts val="2000"/>
+              </a:spcAft>
+              <a:buFontTx/>
+              <a:buChar char="-"/>
+            </a:pPr>
+            <a:r>
+              <a:rPr lang="en-US" dirty="0"/>
+              <a:t>Easier to Build and Maintain </a:t>
+            </a:r>
+            <a:r>
+              <a:rPr lang="en-US" dirty="0" smtClean="0"/>
+              <a:t>Apps - </a:t>
+            </a:r>
+            <a:r>
+              <a:rPr lang="en-US" dirty="0"/>
+              <a:t>Applications become easier to build and maintain when they’re split into a set of smaller, </a:t>
+            </a:r>
+            <a:r>
+              <a:rPr lang="en-US" dirty="0" err="1"/>
+              <a:t>composable</a:t>
+            </a:r>
+            <a:r>
+              <a:rPr lang="en-US" dirty="0"/>
+              <a:t> fragments</a:t>
+            </a:r>
+            <a:r>
+              <a:rPr lang="en-US" dirty="0" smtClean="0"/>
+              <a:t>. </a:t>
+            </a:r>
+            <a:r>
+              <a:rPr lang="en-US" dirty="0"/>
+              <a:t>Managing the code also becomes less painful because each </a:t>
+            </a:r>
+            <a:r>
+              <a:rPr lang="en-US" dirty="0" err="1"/>
+              <a:t>microservice</a:t>
+            </a:r>
+            <a:r>
+              <a:rPr lang="en-US" dirty="0"/>
+              <a:t> is, in fact, a separate chunk of code.</a:t>
+            </a:r>
+          </a:p>
+          <a:p>
+            <a:pPr>
+              <a:spcAft>
+                <a:spcPts val="2000"/>
+              </a:spcAft>
+              <a:buFontTx/>
+              <a:buChar char="-"/>
+            </a:pPr>
+            <a:r>
+              <a:rPr lang="en-US" dirty="0"/>
+              <a:t>Organized Around Business </a:t>
+            </a:r>
+            <a:r>
+              <a:rPr lang="en-US" dirty="0" smtClean="0"/>
+              <a:t>Capabilities</a:t>
+            </a:r>
+            <a:r>
+              <a:rPr lang="en-US" dirty="0" smtClean="0"/>
+              <a:t> - </a:t>
+            </a:r>
+            <a:r>
+              <a:rPr lang="en-US" dirty="0" err="1"/>
+              <a:t>microservice</a:t>
+            </a:r>
+            <a:r>
+              <a:rPr lang="en-US" dirty="0"/>
+              <a:t> architectures invite teams to focus </a:t>
+            </a:r>
+            <a:r>
+              <a:rPr lang="en-US" dirty="0" smtClean="0"/>
+              <a:t>on building business functionality instead of writing glue code.</a:t>
+            </a:r>
+            <a:endParaRPr lang="en-US" dirty="0" smtClean="0"/>
           </a:p>
         </p:txBody>
       </p:sp>
@@ -4746,6 +4791,73 @@
               <a:buFontTx/>
               <a:buChar char="-"/>
             </a:pPr>
+            <a:r>
+              <a:rPr lang="en-US" dirty="0" smtClean="0"/>
+              <a:t>Microservices are more complex – this can cause delay for developers unfamiliar to the process</a:t>
+            </a:r>
+          </a:p>
+          <a:p>
+            <a:pPr>
+              <a:buFontTx/>
+              <a:buChar char="-"/>
+            </a:pPr>
+            <a:r>
+              <a:rPr lang="en-US" dirty="0" smtClean="0"/>
+              <a:t>Microservices require cultural changes – everybody must get on board and be on the same page which can be difficult in some companies</a:t>
+            </a:r>
+          </a:p>
+          <a:p>
+            <a:pPr>
+              <a:buFontTx/>
+              <a:buChar char="-"/>
+            </a:pPr>
+            <a:r>
+              <a:rPr lang="en-US" dirty="0" smtClean="0"/>
+              <a:t>Microservices are more expensive – since services need to communicate with each other, this will result in many remote calls</a:t>
+            </a:r>
+          </a:p>
+          <a:p>
+            <a:pPr>
+              <a:buFontTx/>
+              <a:buChar char="-"/>
+            </a:pPr>
+            <a:r>
+              <a:rPr lang="en-US" dirty="0" smtClean="0"/>
+              <a:t>Microservices pose security challenges – due to the several remote calls, each opens an opportunity for outsiders to gain access to the system</a:t>
+            </a:r>
+          </a:p>
+          <a:p>
+            <a:pPr>
+              <a:buFontTx/>
+              <a:buChar char="-"/>
+            </a:pPr>
+            <a:r>
+              <a:rPr lang="en-US" dirty="0" smtClean="0"/>
+              <a:t>Microservices create more testing – due to the amount of services, more testing will need to be conducted</a:t>
+            </a:r>
+          </a:p>
+          <a:p>
+            <a:pPr>
+              <a:buFontTx/>
+              <a:buChar char="-"/>
+            </a:pPr>
+            <a:r>
+              <a:rPr lang="en-US" dirty="0" smtClean="0"/>
+              <a:t>Microservices create an increased need for team management &amp; communication</a:t>
+            </a:r>
+          </a:p>
+          <a:p>
+            <a:pPr>
+              <a:buFontTx/>
+              <a:buChar char="-"/>
+            </a:pPr>
+            <a:endParaRPr lang="en-US" dirty="0" smtClean="0"/>
+          </a:p>
+          <a:p>
+            <a:pPr>
+              <a:buFontTx/>
+              <a:buChar char="-"/>
+            </a:pPr>
             <a:endParaRPr lang="en-US" dirty="0"/>
           </a:p>
           <a:p>
@@ -5056,7 +5168,19 @@
             </a:pPr>
             <a:r>
               <a:rPr lang="en-US" b="1" dirty="0" smtClean="0"/>
-              <a:t>How are Microservices deployed and managed in a production environment</a:t>
+              <a:t>How are Microservices deployed </a:t>
+            </a:r>
+            <a:r>
+              <a:rPr lang="en-US" b="1" dirty="0" smtClean="0"/>
+              <a:t>in </a:t>
+            </a:r>
+            <a:r>
+              <a:rPr lang="en-US" b="1" dirty="0" smtClean="0"/>
+              <a:t>a production </a:t>
+            </a:r>
+            <a:r>
+              <a:rPr lang="en-US" b="1" dirty="0" smtClean="0"/>
+              <a:t>environment?</a:t>
             </a:r>
           </a:p>
           <a:p>
@@ -5064,6 +5188,109 @@
               <a:buFontTx/>
               <a:buChar char="-"/>
             </a:pPr>
+            <a:r>
+              <a:rPr lang="en-US" dirty="0" smtClean="0"/>
+              <a:t>Microservices can be deployed through a pattern known as Multiple Service Instances per Host</a:t>
+            </a:r>
+          </a:p>
+          <a:p>
+            <a:pPr lvl="1" fontAlgn="base">
+              <a:buFontTx/>
+              <a:buChar char="-"/>
+            </a:pPr>
+            <a:r>
+              <a:rPr lang="en-US" dirty="0" smtClean="0"/>
+              <a:t>The pattern states one or more physical or virtual hosts are provisioned and run multiple service instances on each one</a:t>
+            </a:r>
+          </a:p>
+          <a:p>
+            <a:pPr lvl="1" fontAlgn="base">
+              <a:buFontTx/>
+              <a:buChar char="-"/>
+            </a:pPr>
+            <a:r>
+              <a:rPr lang="en-US" dirty="0"/>
+              <a:t>Multiple service instances share the server and its operating </a:t>
+            </a:r>
+            <a:r>
+              <a:rPr lang="en-US" dirty="0" smtClean="0"/>
+              <a:t>system</a:t>
+            </a:r>
+          </a:p>
+          <a:p>
+            <a:pPr lvl="1" fontAlgn="base">
+              <a:buFontTx/>
+              <a:buChar char="-"/>
+            </a:pPr>
+            <a:r>
+              <a:rPr lang="en-US" dirty="0" smtClean="0"/>
+              <a:t>Deploying </a:t>
+            </a:r>
+            <a:r>
+              <a:rPr lang="en-US" dirty="0"/>
+              <a:t>a service instance is relatively </a:t>
+            </a:r>
+            <a:r>
+              <a:rPr lang="en-US" dirty="0" smtClean="0"/>
+              <a:t>fast</a:t>
+            </a:r>
+          </a:p>
+          <a:p>
+            <a:pPr fontAlgn="base">
+              <a:buFontTx/>
+              <a:buChar char="-"/>
+            </a:pPr>
+            <a:r>
+              <a:rPr lang="en-US" dirty="0" smtClean="0"/>
+              <a:t>Another pattern: </a:t>
+            </a:r>
+            <a:r>
+              <a:rPr lang="en-US" dirty="0"/>
+              <a:t>Service Instance per Host Pattern</a:t>
+            </a:r>
+          </a:p>
+          <a:p>
+            <a:pPr lvl="1" fontAlgn="base">
+              <a:buFontTx/>
+              <a:buChar char="-"/>
+            </a:pPr>
+            <a:r>
+              <a:rPr lang="en-US" dirty="0" smtClean="0"/>
+              <a:t>Run </a:t>
+            </a:r>
+            <a:r>
+              <a:rPr lang="en-US" dirty="0"/>
+              <a:t>each service instance in isolation on its own host</a:t>
+            </a:r>
+            <a:endParaRPr lang="en-US" dirty="0" smtClean="0"/>
+          </a:p>
+          <a:p>
+            <a:pPr lvl="1" fontAlgn="base">
+              <a:buFontTx/>
+              <a:buChar char="-"/>
+            </a:pPr>
+            <a:r>
+              <a:rPr lang="en-US" dirty="0"/>
+              <a:t>Service Instance per Virtual Machine and Service Instance per </a:t>
+            </a:r>
+            <a:r>
+              <a:rPr lang="en-US" dirty="0" smtClean="0"/>
+              <a:t>Container</a:t>
+            </a:r>
+          </a:p>
+          <a:p>
+            <a:pPr fontAlgn="base">
+              <a:buFontTx/>
+              <a:buChar char="-"/>
+            </a:pPr>
+            <a:r>
+              <a:rPr lang="en-US" dirty="0"/>
+              <a:t>Service Instance per Container </a:t>
+            </a:r>
+            <a:r>
+              <a:rPr lang="en-US" dirty="0" smtClean="0"/>
+              <a:t>Pattern</a:t>
+            </a:r>
             <a:endParaRPr lang="en-US" dirty="0"/>
           </a:p>
         </p:txBody>
@@ -5144,8 +5371,8 @@
         </p:nvSpPr>
         <p:spPr>
           <a:xfrm>
-            <a:off x="541609" y="1455491"/>
-            <a:ext cx="9374748" cy="4607958"/>
+            <a:off x="541608" y="1404730"/>
+            <a:ext cx="11121147" cy="5340626"/>
           </a:xfrm>
           <a:prstGeom prst="rect">
             <a:avLst/>
@@ -5350,19 +5577,17 @@
             </a:lvl9pPr>
           </a:lstStyle>
           <a:p>
-            <a:pPr marL="0" indent="0">
-              <a:spcAft>
-                <a:spcPts val="2000"/>
-              </a:spcAft>
-              <a:buNone/>
-            </a:pPr>
-            <a:endParaRPr lang="en-US" sz="1400" b="1" dirty="0" smtClean="0"/>
+            <a:pPr lvl="1" fontAlgn="base">
+              <a:buFontTx/>
+              <a:buChar char="-"/>
+            </a:pPr>
+            <a:endParaRPr lang="en-US" dirty="0"/>
           </a:p>
         </p:txBody>
       </p:sp>
       <p:sp>
         <p:nvSpPr>
-          <p:cNvPr id="6" name="Content Placeholder 17"/>
+          <p:cNvPr id="5" name="Content Placeholder 17"/>
           <p:cNvSpPr txBox="1">
             <a:spLocks/>
           </p:cNvSpPr>
@@ -5370,8 +5595,8 @@
         </p:nvSpPr>
         <p:spPr>
           <a:xfrm>
-            <a:off x="694009" y="1607891"/>
-            <a:ext cx="9374748" cy="4607958"/>
+            <a:off x="541608" y="1455491"/>
+            <a:ext cx="10940149" cy="4919430"/>
           </a:xfrm>
           <a:prstGeom prst="rect">
             <a:avLst/>
@@ -5379,7 +5604,7 @@
         </p:spPr>
         <p:txBody>
           <a:bodyPr vert="horz" lIns="91440" tIns="45720" rIns="91440" bIns="45720" rtlCol="0">
-            <a:normAutofit/>
+            <a:noAutofit/>
           </a:bodyPr>
           <a:lstStyle>
             <a:lvl1pPr marL="228600" indent="-228600" algn="l" defTabSz="914400" rtl="0" eaLnBrk="1" latinLnBrk="0" hangingPunct="1">
@@ -5582,9 +5807,20 @@
             </a:pPr>
             <a:r>
               <a:rPr lang="en-US" b="1" dirty="0" smtClean="0"/>
-              <a:t>How are Microservices scaled?</a:t>
-            </a:r>
-            <a:endParaRPr lang="en-US" b="1" dirty="0" smtClean="0"/>
+              <a:t>How are Microservices </a:t>
+            </a:r>
+            <a:r>
+              <a:rPr lang="en-US" b="1" dirty="0" smtClean="0"/>
+              <a:t>managed </a:t>
+            </a:r>
+            <a:r>
+              <a:rPr lang="en-US" b="1" dirty="0" smtClean="0"/>
+              <a:t>in a production </a:t>
+            </a:r>
+            <a:r>
+              <a:rPr lang="en-US" b="1" dirty="0" smtClean="0"/>
+              <a:t>environment?</a:t>
+            </a:r>
           </a:p>
           <a:p>
             <a:pPr fontAlgn="base">
@@ -5593,30 +5829,145 @@
             </a:pPr>
             <a:r>
               <a:rPr lang="en-US" dirty="0" smtClean="0"/>
-              <a:t/>
-            </a:r>
-            <a:br>
+              <a:t>Using the ‘Keep it Simple Stupid’ method</a:t>
+            </a:r>
+          </a:p>
+          <a:p>
+            <a:pPr fontAlgn="base">
+              <a:buFontTx/>
+              <a:buChar char="-"/>
+            </a:pPr>
+            <a:r>
               <a:rPr lang="en-US" dirty="0" smtClean="0"/>
-            </a:br>
+              <a:t>Put a management plan into place early on by developing best practices in deployments, security, and operations</a:t>
+            </a:r>
+          </a:p>
+          <a:p>
+            <a:pPr fontAlgn="base">
+              <a:buFontTx/>
+              <a:buChar char="-"/>
+            </a:pPr>
+            <a:r>
+              <a:rPr lang="en-US" dirty="0"/>
+              <a:t>Tap into an orchestration </a:t>
+            </a:r>
             <a:r>
               <a:rPr lang="en-US" dirty="0" smtClean="0"/>
-              <a:t/>
-            </a:r>
-            <a:br>
+              <a:t>platform – each </a:t>
+            </a:r>
+            <a:r>
+              <a:rPr lang="en-US" dirty="0" err="1" smtClean="0"/>
+              <a:t>microservice</a:t>
+            </a:r>
+            <a:r>
               <a:rPr lang="en-US" dirty="0" smtClean="0"/>
-            </a:br>
+              <a:t> </a:t>
+            </a:r>
+            <a:r>
+              <a:rPr lang="en-US" dirty="0"/>
+              <a:t>needs to share its status with a management application. From there, decisions can be made about the lifecycle of </a:t>
+            </a:r>
             <a:r>
               <a:rPr lang="en-US" dirty="0" smtClean="0"/>
-              <a:t>	</a:t>
-            </a:r>
+              <a:t>Microservices</a:t>
+            </a:r>
+          </a:p>
+          <a:p>
+            <a:pPr fontAlgn="base">
+              <a:buFontTx/>
+              <a:buChar char="-"/>
+            </a:pPr>
+            <a:r>
+              <a:rPr lang="en-US" dirty="0"/>
+              <a:t>Develop a minimum set of operational </a:t>
+            </a:r>
+            <a:r>
+              <a:rPr lang="en-US" dirty="0" smtClean="0"/>
+              <a:t>capabilities - </a:t>
+            </a:r>
+            <a:r>
+              <a:rPr lang="en-US" dirty="0"/>
+              <a:t>ensure that each containerized </a:t>
+            </a:r>
+            <a:r>
+              <a:rPr lang="en-US" dirty="0" err="1"/>
+              <a:t>microservice</a:t>
+            </a:r>
+            <a:r>
+              <a:rPr lang="en-US" dirty="0"/>
+              <a:t> adheres to a “minimum set of operational capabilities” so that it works well within such an environment</a:t>
+            </a:r>
+            <a:r>
+              <a:rPr lang="en-US" dirty="0" smtClean="0"/>
+              <a:t>.</a:t>
+            </a:r>
+          </a:p>
+          <a:p>
+            <a:pPr fontAlgn="base">
+              <a:buFontTx/>
+              <a:buChar char="-"/>
+            </a:pPr>
+            <a:r>
+              <a:rPr lang="en-US" dirty="0"/>
+              <a:t>Implement continuous integration and continuous </a:t>
+            </a:r>
+            <a:r>
+              <a:rPr lang="en-US" dirty="0" smtClean="0"/>
+              <a:t>delivery</a:t>
+            </a:r>
+          </a:p>
+          <a:p>
+            <a:pPr lvl="1" fontAlgn="base">
+              <a:buFontTx/>
+              <a:buChar char="-"/>
+            </a:pPr>
+            <a:r>
+              <a:rPr lang="en-US" dirty="0"/>
+              <a:t>Without CI/CD, the maintenance of </a:t>
+            </a:r>
+            <a:r>
+              <a:rPr lang="en-US" dirty="0" err="1"/>
+              <a:t>microservices</a:t>
+            </a:r>
+            <a:r>
+              <a:rPr lang="en-US" dirty="0"/>
+              <a:t> will become overburdened with manual processes, will fail to scale as intended, and will ultimately cost more than a monolith application in both infrastructure and human </a:t>
+            </a:r>
+            <a:r>
+              <a:rPr lang="en-US" dirty="0" smtClean="0"/>
+              <a:t>resources</a:t>
+            </a:r>
+          </a:p>
+          <a:p>
+            <a:pPr lvl="1" fontAlgn="base">
+              <a:buFontTx/>
+              <a:buChar char="-"/>
+            </a:pPr>
+            <a:r>
+              <a:rPr lang="en-US" dirty="0"/>
+              <a:t>Over time, CI/CD will help your team unlock the potential of an orchestration or management tool, especially when it comes to managing how CPUs, memory, and storage are allocated across a pool of hosts</a:t>
+            </a:r>
+          </a:p>
+          <a:p>
+            <a:pPr fontAlgn="base">
+              <a:buFontTx/>
+              <a:buChar char="-"/>
+            </a:pPr>
             <a:endParaRPr lang="en-US" dirty="0"/>
+          </a:p>
+          <a:p>
+            <a:pPr fontAlgn="base">
+              <a:buFontTx/>
+              <a:buChar char="-"/>
+            </a:pPr>
+            <a:endParaRPr lang="en-US" dirty="0" smtClean="0"/>
           </a:p>
         </p:txBody>
       </p:sp>
     </p:spTree>
     <p:extLst>
       <p:ext uri="{BB962C8B-B14F-4D97-AF65-F5344CB8AC3E}">
-        <p14:creationId xmlns:p14="http://schemas.microsoft.com/office/powerpoint/2010/main" val="422822416"/>
+        <p14:creationId xmlns:p14="http://schemas.microsoft.com/office/powerpoint/2010/main" val="3702741959"/>
       </p:ext>
     </p:extLst>
   </p:cSld>
@@ -5689,8 +6040,8 @@
         </p:nvSpPr>
         <p:spPr>
           <a:xfrm>
-            <a:off x="541608" y="1404730"/>
-            <a:ext cx="11121147" cy="5340626"/>
+            <a:off x="541609" y="1455491"/>
+            <a:ext cx="9374748" cy="4607958"/>
           </a:xfrm>
           <a:prstGeom prst="rect">
             <a:avLst/>
@@ -5895,18 +6246,330 @@
             </a:lvl9pPr>
           </a:lstStyle>
           <a:p>
-            <a:pPr lvl="1" fontAlgn="base">
+            <a:pPr marL="0" indent="0">
+              <a:spcAft>
+                <a:spcPts val="2000"/>
+              </a:spcAft>
+              <a:buNone/>
+            </a:pPr>
+            <a:endParaRPr lang="en-US" sz="1400" b="1" dirty="0" smtClean="0"/>
+          </a:p>
+        </p:txBody>
+      </p:sp>
+      <p:sp>
+        <p:nvSpPr>
+          <p:cNvPr id="6" name="Content Placeholder 17"/>
+          <p:cNvSpPr txBox="1">
+            <a:spLocks/>
+          </p:cNvSpPr>
+          <p:nvPr/>
+        </p:nvSpPr>
+        <p:spPr>
+          <a:xfrm>
+            <a:off x="694009" y="1607891"/>
+            <a:ext cx="9374748" cy="4607958"/>
+          </a:xfrm>
+          <a:prstGeom prst="rect">
+            <a:avLst/>
+          </a:prstGeom>
+        </p:spPr>
+        <p:txBody>
+          <a:bodyPr vert="horz" lIns="91440" tIns="45720" rIns="91440" bIns="45720" rtlCol="0">
+            <a:normAutofit/>
+          </a:bodyPr>
+          <a:lstStyle>
+            <a:lvl1pPr marL="228600" indent="-228600" algn="l" defTabSz="914400" rtl="0" eaLnBrk="1" latinLnBrk="0" hangingPunct="1">
+              <a:lnSpc>
+                <a:spcPts val="1800"/>
+              </a:lnSpc>
+              <a:spcBef>
+                <a:spcPts val="1000"/>
+              </a:spcBef>
+              <a:spcAft>
+                <a:spcPts val="1000"/>
+              </a:spcAft>
+              <a:buFont typeface="Arial" panose="020B0604020202020204" pitchFamily="34" charset="0"/>
+              <a:buChar char="•"/>
+              <a:defRPr lang="en-US" sz="1200" kern="1200" smtClean="0">
+                <a:solidFill>
+                  <a:schemeClr val="tx1">
+                    <a:lumMod val="75000"/>
+                    <a:lumOff val="25000"/>
+                  </a:schemeClr>
+                </a:solidFill>
+                <a:latin typeface="+mn-lt"/>
+                <a:ea typeface="+mn-ea"/>
+                <a:cs typeface="+mn-cs"/>
+              </a:defRPr>
+            </a:lvl1pPr>
+            <a:lvl2pPr marL="685800" indent="-228600" algn="l" defTabSz="914400" rtl="0" eaLnBrk="1" latinLnBrk="0" hangingPunct="1">
+              <a:lnSpc>
+                <a:spcPts val="1800"/>
+              </a:lnSpc>
+              <a:spcBef>
+                <a:spcPts val="1000"/>
+              </a:spcBef>
+              <a:spcAft>
+                <a:spcPts val="1000"/>
+              </a:spcAft>
+              <a:buFont typeface="Arial" panose="020B0604020202020204" pitchFamily="34" charset="0"/>
+              <a:buChar char="•"/>
+              <a:defRPr lang="en-US" sz="1200" kern="1200" smtClean="0">
+                <a:solidFill>
+                  <a:schemeClr val="tx1">
+                    <a:lumMod val="75000"/>
+                    <a:lumOff val="25000"/>
+                  </a:schemeClr>
+                </a:solidFill>
+                <a:latin typeface="+mn-lt"/>
+                <a:ea typeface="+mn-ea"/>
+                <a:cs typeface="+mn-cs"/>
+              </a:defRPr>
+            </a:lvl2pPr>
+            <a:lvl3pPr marL="1143000" indent="-228600" algn="l" defTabSz="914400" rtl="0" eaLnBrk="1" latinLnBrk="0" hangingPunct="1">
+              <a:lnSpc>
+                <a:spcPts val="1800"/>
+              </a:lnSpc>
+              <a:spcBef>
+                <a:spcPts val="1000"/>
+              </a:spcBef>
+              <a:spcAft>
+                <a:spcPts val="1000"/>
+              </a:spcAft>
+              <a:buFont typeface="Arial" panose="020B0604020202020204" pitchFamily="34" charset="0"/>
+              <a:buChar char="•"/>
+              <a:defRPr lang="en-US" sz="1200" kern="1200" smtClean="0">
+                <a:solidFill>
+                  <a:schemeClr val="tx1">
+                    <a:lumMod val="75000"/>
+                    <a:lumOff val="25000"/>
+                  </a:schemeClr>
+                </a:solidFill>
+                <a:latin typeface="+mn-lt"/>
+                <a:ea typeface="+mn-ea"/>
+                <a:cs typeface="+mn-cs"/>
+              </a:defRPr>
+            </a:lvl3pPr>
+            <a:lvl4pPr marL="1600200" indent="-228600" algn="l" defTabSz="914400" rtl="0" eaLnBrk="1" latinLnBrk="0" hangingPunct="1">
+              <a:lnSpc>
+                <a:spcPts val="1800"/>
+              </a:lnSpc>
+              <a:spcBef>
+                <a:spcPts val="1000"/>
+              </a:spcBef>
+              <a:spcAft>
+                <a:spcPts val="1000"/>
+              </a:spcAft>
+              <a:buFont typeface="Arial" panose="020B0604020202020204" pitchFamily="34" charset="0"/>
+              <a:buChar char="•"/>
+              <a:defRPr lang="en-US" sz="1200" kern="1200" smtClean="0">
+                <a:solidFill>
+                  <a:schemeClr val="tx1">
+                    <a:lumMod val="75000"/>
+                    <a:lumOff val="25000"/>
+                  </a:schemeClr>
+                </a:solidFill>
+                <a:latin typeface="+mn-lt"/>
+                <a:ea typeface="+mn-ea"/>
+                <a:cs typeface="+mn-cs"/>
+              </a:defRPr>
+            </a:lvl4pPr>
+            <a:lvl5pPr marL="2057400" indent="-228600" algn="l" defTabSz="914400" rtl="0" eaLnBrk="1" latinLnBrk="0" hangingPunct="1">
+              <a:lnSpc>
+                <a:spcPts val="1800"/>
+              </a:lnSpc>
+              <a:spcBef>
+                <a:spcPts val="1000"/>
+              </a:spcBef>
+              <a:spcAft>
+                <a:spcPts val="1000"/>
+              </a:spcAft>
+              <a:buFont typeface="Arial" panose="020B0604020202020204" pitchFamily="34" charset="0"/>
+              <a:buChar char="•"/>
+              <a:defRPr lang="en-US" sz="1200" kern="1200">
+                <a:solidFill>
+                  <a:schemeClr val="tx1">
+                    <a:lumMod val="75000"/>
+                    <a:lumOff val="25000"/>
+                  </a:schemeClr>
+                </a:solidFill>
+                <a:latin typeface="+mn-lt"/>
+                <a:ea typeface="+mn-ea"/>
+                <a:cs typeface="+mn-cs"/>
+              </a:defRPr>
+            </a:lvl5pPr>
+            <a:lvl6pPr marL="2514600" indent="-228600" algn="l" defTabSz="914400" rtl="0" eaLnBrk="1" latinLnBrk="0" hangingPunct="1">
+              <a:lnSpc>
+                <a:spcPct val="90000"/>
+              </a:lnSpc>
+              <a:spcBef>
+                <a:spcPct val="30000"/>
+              </a:spcBef>
+              <a:buFont typeface="Arial" panose="020B0604020202020204" pitchFamily="34" charset="0"/>
+              <a:buChar char="•"/>
+              <a:defRPr sz="1800" kern="1200">
+                <a:solidFill>
+                  <a:schemeClr val="tx1"/>
+                </a:solidFill>
+                <a:latin typeface="+mn-lt"/>
+                <a:ea typeface="+mn-ea"/>
+                <a:cs typeface="+mn-cs"/>
+              </a:defRPr>
+            </a:lvl6pPr>
+            <a:lvl7pPr marL="2971800" indent="-228600" algn="l" defTabSz="914400" rtl="0" eaLnBrk="1" latinLnBrk="0" hangingPunct="1">
+              <a:lnSpc>
+                <a:spcPct val="90000"/>
+              </a:lnSpc>
+              <a:spcBef>
+                <a:spcPct val="30000"/>
+              </a:spcBef>
+              <a:buFont typeface="Arial" panose="020B0604020202020204" pitchFamily="34" charset="0"/>
+              <a:buChar char="•"/>
+              <a:defRPr sz="1800" kern="1200">
+                <a:solidFill>
+                  <a:schemeClr val="tx1"/>
+                </a:solidFill>
+                <a:latin typeface="+mn-lt"/>
+                <a:ea typeface="+mn-ea"/>
+                <a:cs typeface="+mn-cs"/>
+              </a:defRPr>
+            </a:lvl7pPr>
+            <a:lvl8pPr marL="3429000" indent="-228600" algn="l" defTabSz="914400" rtl="0" eaLnBrk="1" latinLnBrk="0" hangingPunct="1">
+              <a:lnSpc>
+                <a:spcPct val="90000"/>
+              </a:lnSpc>
+              <a:spcBef>
+                <a:spcPct val="30000"/>
+              </a:spcBef>
+              <a:buFont typeface="Arial" panose="020B0604020202020204" pitchFamily="34" charset="0"/>
+              <a:buChar char="•"/>
+              <a:defRPr sz="1800" kern="1200">
+                <a:solidFill>
+                  <a:schemeClr val="tx1"/>
+                </a:solidFill>
+                <a:latin typeface="+mn-lt"/>
+                <a:ea typeface="+mn-ea"/>
+                <a:cs typeface="+mn-cs"/>
+              </a:defRPr>
+            </a:lvl8pPr>
+            <a:lvl9pPr marL="3886200" indent="-228600" algn="l" defTabSz="914400" rtl="0" eaLnBrk="1" latinLnBrk="0" hangingPunct="1">
+              <a:lnSpc>
+                <a:spcPct val="90000"/>
+              </a:lnSpc>
+              <a:spcBef>
+                <a:spcPct val="30000"/>
+              </a:spcBef>
+              <a:buFont typeface="Arial" panose="020B0604020202020204" pitchFamily="34" charset="0"/>
+              <a:buChar char="•"/>
+              <a:defRPr sz="1800" kern="1200">
+                <a:solidFill>
+                  <a:schemeClr val="tx1"/>
+                </a:solidFill>
+                <a:latin typeface="+mn-lt"/>
+                <a:ea typeface="+mn-ea"/>
+                <a:cs typeface="+mn-cs"/>
+              </a:defRPr>
+            </a:lvl9pPr>
+          </a:lstStyle>
+          <a:p>
+            <a:pPr fontAlgn="base">
               <a:buFontTx/>
               <a:buChar char="-"/>
             </a:pPr>
-            <a:endParaRPr lang="en-US" dirty="0"/>
+            <a:r>
+              <a:rPr lang="en-US" sz="1400" b="1" dirty="0" smtClean="0"/>
+              <a:t>How are Microservices scaled?</a:t>
+            </a:r>
+          </a:p>
+          <a:p>
+            <a:pPr fontAlgn="base">
+              <a:buFontTx/>
+              <a:buChar char="-"/>
+            </a:pPr>
+            <a:r>
+              <a:rPr lang="en-US" sz="1400" dirty="0" smtClean="0"/>
+              <a:t>Microservices usually communicate through well defined interfaces like REST</a:t>
+            </a:r>
+          </a:p>
+          <a:p>
+            <a:pPr fontAlgn="base">
+              <a:buFontTx/>
+              <a:buChar char="-"/>
+            </a:pPr>
+            <a:r>
+              <a:rPr lang="en-US" sz="1400" dirty="0" smtClean="0"/>
+              <a:t>Communications are almost always stateless</a:t>
+            </a:r>
+          </a:p>
+          <a:p>
+            <a:pPr fontAlgn="base">
+              <a:buFontTx/>
+              <a:buChar char="-"/>
+            </a:pPr>
+            <a:r>
+              <a:rPr lang="en-US" sz="1400" dirty="0" err="1" smtClean="0"/>
+              <a:t>Microservice</a:t>
+            </a:r>
+            <a:r>
+              <a:rPr lang="en-US" sz="1400" dirty="0" smtClean="0"/>
+              <a:t> data is responsible for it’s own data model and data</a:t>
+            </a:r>
+          </a:p>
+          <a:p>
+            <a:pPr fontAlgn="base">
+              <a:buFontTx/>
+              <a:buChar char="-"/>
+            </a:pPr>
+            <a:r>
+              <a:rPr lang="en-US" sz="1400" dirty="0" smtClean="0"/>
+              <a:t>Breaking the system into small parts allows each micro service to focus on a single business capability</a:t>
+            </a:r>
+          </a:p>
+          <a:p>
+            <a:pPr fontAlgn="base">
+              <a:buFontTx/>
+              <a:buChar char="-"/>
+            </a:pPr>
+            <a:r>
+              <a:rPr lang="en-US" sz="1400" dirty="0" smtClean="0"/>
+              <a:t>Simple interfaces allow for different languages and tools</a:t>
+            </a:r>
+          </a:p>
+          <a:p>
+            <a:pPr fontAlgn="base">
+              <a:buFontTx/>
+              <a:buChar char="-"/>
+            </a:pPr>
+            <a:r>
+              <a:rPr lang="en-US" sz="1400" dirty="0" smtClean="0"/>
+              <a:t>Proper built Microservices will be able to continue if another fails</a:t>
+            </a:r>
+            <a:r>
+              <a:rPr lang="en-US" sz="1400" dirty="0" smtClean="0"/>
+              <a:t/>
+            </a:r>
+            <a:br>
+              <a:rPr lang="en-US" sz="1400" dirty="0" smtClean="0"/>
+            </a:br>
+            <a:r>
+              <a:rPr lang="en-US" sz="1400" dirty="0" smtClean="0"/>
+              <a:t/>
+            </a:r>
+            <a:br>
+              <a:rPr lang="en-US" sz="1400" dirty="0" smtClean="0"/>
+            </a:br>
+            <a:r>
+              <a:rPr lang="en-US" sz="1400" dirty="0" smtClean="0"/>
+              <a:t>	</a:t>
+            </a:r>
+            <a:endParaRPr lang="en-US" sz="1400" dirty="0"/>
           </a:p>
         </p:txBody>
       </p:sp>
     </p:spTree>
     <p:extLst>
       <p:ext uri="{BB962C8B-B14F-4D97-AF65-F5344CB8AC3E}">
-        <p14:creationId xmlns:p14="http://schemas.microsoft.com/office/powerpoint/2010/main" val="3702741959"/>
+        <p14:creationId xmlns:p14="http://schemas.microsoft.com/office/powerpoint/2010/main" val="422822416"/>
       </p:ext>
     </p:extLst>
   </p:cSld>
@@ -6195,6 +6858,326 @@
               <a:buChar char="-"/>
             </a:pPr>
             <a:endParaRPr lang="en-US" dirty="0"/>
+          </a:p>
+        </p:txBody>
+      </p:sp>
+      <p:pic>
+        <p:nvPicPr>
+          <p:cNvPr id="2" name="Picture 1"/>
+          <p:cNvPicPr>
+            <a:picLocks noChangeAspect="1"/>
+          </p:cNvPicPr>
+          <p:nvPr/>
+        </p:nvPicPr>
+        <p:blipFill>
+          <a:blip r:embed="rId3">
+            <a:extLst>
+              <a:ext uri="{28A0092B-C50C-407E-A947-70E740481C1C}">
+                <a14:useLocalDpi xmlns:a14="http://schemas.microsoft.com/office/drawing/2010/main" val="0"/>
+              </a:ext>
+            </a:extLst>
+          </a:blip>
+          <a:stretch>
+            <a:fillRect/>
+          </a:stretch>
+        </p:blipFill>
+        <p:spPr>
+          <a:xfrm>
+            <a:off x="646571" y="1375977"/>
+            <a:ext cx="6844444" cy="4698413"/>
+          </a:xfrm>
+          <a:prstGeom prst="rect">
+            <a:avLst/>
+          </a:prstGeom>
+        </p:spPr>
+      </p:pic>
+      <p:sp>
+        <p:nvSpPr>
+          <p:cNvPr id="6" name="Content Placeholder 17"/>
+          <p:cNvSpPr txBox="1">
+            <a:spLocks/>
+          </p:cNvSpPr>
+          <p:nvPr/>
+        </p:nvSpPr>
+        <p:spPr>
+          <a:xfrm>
+            <a:off x="7491015" y="1375977"/>
+            <a:ext cx="4078132" cy="4839872"/>
+          </a:xfrm>
+          <a:prstGeom prst="rect">
+            <a:avLst/>
+          </a:prstGeom>
+        </p:spPr>
+        <p:txBody>
+          <a:bodyPr vert="horz" lIns="91440" tIns="45720" rIns="91440" bIns="45720" rtlCol="0">
+            <a:normAutofit/>
+          </a:bodyPr>
+          <a:lstStyle>
+            <a:lvl1pPr marL="228600" indent="-228600" algn="l" defTabSz="914400" rtl="0" eaLnBrk="1" latinLnBrk="0" hangingPunct="1">
+              <a:lnSpc>
+                <a:spcPts val="1800"/>
+              </a:lnSpc>
+              <a:spcBef>
+                <a:spcPts val="1000"/>
+              </a:spcBef>
+              <a:spcAft>
+                <a:spcPts val="1000"/>
+              </a:spcAft>
+              <a:buFont typeface="Arial" panose="020B0604020202020204" pitchFamily="34" charset="0"/>
+              <a:buChar char="•"/>
+              <a:defRPr lang="en-US" sz="1200" kern="1200" smtClean="0">
+                <a:solidFill>
+                  <a:schemeClr val="tx1">
+                    <a:lumMod val="75000"/>
+                    <a:lumOff val="25000"/>
+                  </a:schemeClr>
+                </a:solidFill>
+                <a:latin typeface="+mn-lt"/>
+                <a:ea typeface="+mn-ea"/>
+                <a:cs typeface="+mn-cs"/>
+              </a:defRPr>
+            </a:lvl1pPr>
+            <a:lvl2pPr marL="685800" indent="-228600" algn="l" defTabSz="914400" rtl="0" eaLnBrk="1" latinLnBrk="0" hangingPunct="1">
+              <a:lnSpc>
+                <a:spcPts val="1800"/>
+              </a:lnSpc>
+              <a:spcBef>
+                <a:spcPts val="1000"/>
+              </a:spcBef>
+              <a:spcAft>
+                <a:spcPts val="1000"/>
+              </a:spcAft>
+              <a:buFont typeface="Arial" panose="020B0604020202020204" pitchFamily="34" charset="0"/>
+              <a:buChar char="•"/>
+              <a:defRPr lang="en-US" sz="1200" kern="1200" smtClean="0">
+                <a:solidFill>
+                  <a:schemeClr val="tx1">
+                    <a:lumMod val="75000"/>
+                    <a:lumOff val="25000"/>
+                  </a:schemeClr>
+                </a:solidFill>
+                <a:latin typeface="+mn-lt"/>
+                <a:ea typeface="+mn-ea"/>
+                <a:cs typeface="+mn-cs"/>
+              </a:defRPr>
+            </a:lvl2pPr>
+            <a:lvl3pPr marL="1143000" indent="-228600" algn="l" defTabSz="914400" rtl="0" eaLnBrk="1" latinLnBrk="0" hangingPunct="1">
+              <a:lnSpc>
+                <a:spcPts val="1800"/>
+              </a:lnSpc>
+              <a:spcBef>
+                <a:spcPts val="1000"/>
+              </a:spcBef>
+              <a:spcAft>
+                <a:spcPts val="1000"/>
+              </a:spcAft>
+              <a:buFont typeface="Arial" panose="020B0604020202020204" pitchFamily="34" charset="0"/>
+              <a:buChar char="•"/>
+              <a:defRPr lang="en-US" sz="1200" kern="1200" smtClean="0">
+                <a:solidFill>
+                  <a:schemeClr val="tx1">
+                    <a:lumMod val="75000"/>
+                    <a:lumOff val="25000"/>
+                  </a:schemeClr>
+                </a:solidFill>
+                <a:latin typeface="+mn-lt"/>
+                <a:ea typeface="+mn-ea"/>
+                <a:cs typeface="+mn-cs"/>
+              </a:defRPr>
+            </a:lvl3pPr>
+            <a:lvl4pPr marL="1600200" indent="-228600" algn="l" defTabSz="914400" rtl="0" eaLnBrk="1" latinLnBrk="0" hangingPunct="1">
+              <a:lnSpc>
+                <a:spcPts val="1800"/>
+              </a:lnSpc>
+              <a:spcBef>
+                <a:spcPts val="1000"/>
+              </a:spcBef>
+              <a:spcAft>
+                <a:spcPts val="1000"/>
+              </a:spcAft>
+              <a:buFont typeface="Arial" panose="020B0604020202020204" pitchFamily="34" charset="0"/>
+              <a:buChar char="•"/>
+              <a:defRPr lang="en-US" sz="1200" kern="1200" smtClean="0">
+                <a:solidFill>
+                  <a:schemeClr val="tx1">
+                    <a:lumMod val="75000"/>
+                    <a:lumOff val="25000"/>
+                  </a:schemeClr>
+                </a:solidFill>
+                <a:latin typeface="+mn-lt"/>
+                <a:ea typeface="+mn-ea"/>
+                <a:cs typeface="+mn-cs"/>
+              </a:defRPr>
+            </a:lvl4pPr>
+            <a:lvl5pPr marL="2057400" indent="-228600" algn="l" defTabSz="914400" rtl="0" eaLnBrk="1" latinLnBrk="0" hangingPunct="1">
+              <a:lnSpc>
+                <a:spcPts val="1800"/>
+              </a:lnSpc>
+              <a:spcBef>
+                <a:spcPts val="1000"/>
+              </a:spcBef>
+              <a:spcAft>
+                <a:spcPts val="1000"/>
+              </a:spcAft>
+              <a:buFont typeface="Arial" panose="020B0604020202020204" pitchFamily="34" charset="0"/>
+              <a:buChar char="•"/>
+              <a:defRPr lang="en-US" sz="1200" kern="1200">
+                <a:solidFill>
+                  <a:schemeClr val="tx1">
+                    <a:lumMod val="75000"/>
+                    <a:lumOff val="25000"/>
+                  </a:schemeClr>
+                </a:solidFill>
+                <a:latin typeface="+mn-lt"/>
+                <a:ea typeface="+mn-ea"/>
+                <a:cs typeface="+mn-cs"/>
+              </a:defRPr>
+            </a:lvl5pPr>
+            <a:lvl6pPr marL="2514600" indent="-228600" algn="l" defTabSz="914400" rtl="0" eaLnBrk="1" latinLnBrk="0" hangingPunct="1">
+              <a:lnSpc>
+                <a:spcPct val="90000"/>
+              </a:lnSpc>
+              <a:spcBef>
+                <a:spcPct val="30000"/>
+              </a:spcBef>
+              <a:buFont typeface="Arial" panose="020B0604020202020204" pitchFamily="34" charset="0"/>
+              <a:buChar char="•"/>
+              <a:defRPr sz="1800" kern="1200">
+                <a:solidFill>
+                  <a:schemeClr val="tx1"/>
+                </a:solidFill>
+                <a:latin typeface="+mn-lt"/>
+                <a:ea typeface="+mn-ea"/>
+                <a:cs typeface="+mn-cs"/>
+              </a:defRPr>
+            </a:lvl6pPr>
+            <a:lvl7pPr marL="2971800" indent="-228600" algn="l" defTabSz="914400" rtl="0" eaLnBrk="1" latinLnBrk="0" hangingPunct="1">
+              <a:lnSpc>
+                <a:spcPct val="90000"/>
+              </a:lnSpc>
+              <a:spcBef>
+                <a:spcPct val="30000"/>
+              </a:spcBef>
+              <a:buFont typeface="Arial" panose="020B0604020202020204" pitchFamily="34" charset="0"/>
+              <a:buChar char="•"/>
+              <a:defRPr sz="1800" kern="1200">
+                <a:solidFill>
+                  <a:schemeClr val="tx1"/>
+                </a:solidFill>
+                <a:latin typeface="+mn-lt"/>
+                <a:ea typeface="+mn-ea"/>
+                <a:cs typeface="+mn-cs"/>
+              </a:defRPr>
+            </a:lvl7pPr>
+            <a:lvl8pPr marL="3429000" indent="-228600" algn="l" defTabSz="914400" rtl="0" eaLnBrk="1" latinLnBrk="0" hangingPunct="1">
+              <a:lnSpc>
+                <a:spcPct val="90000"/>
+              </a:lnSpc>
+              <a:spcBef>
+                <a:spcPct val="30000"/>
+              </a:spcBef>
+              <a:buFont typeface="Arial" panose="020B0604020202020204" pitchFamily="34" charset="0"/>
+              <a:buChar char="•"/>
+              <a:defRPr sz="1800" kern="1200">
+                <a:solidFill>
+                  <a:schemeClr val="tx1"/>
+                </a:solidFill>
+                <a:latin typeface="+mn-lt"/>
+                <a:ea typeface="+mn-ea"/>
+                <a:cs typeface="+mn-cs"/>
+              </a:defRPr>
+            </a:lvl8pPr>
+            <a:lvl9pPr marL="3886200" indent="-228600" algn="l" defTabSz="914400" rtl="0" eaLnBrk="1" latinLnBrk="0" hangingPunct="1">
+              <a:lnSpc>
+                <a:spcPct val="90000"/>
+              </a:lnSpc>
+              <a:spcBef>
+                <a:spcPct val="30000"/>
+              </a:spcBef>
+              <a:buFont typeface="Arial" panose="020B0604020202020204" pitchFamily="34" charset="0"/>
+              <a:buChar char="•"/>
+              <a:defRPr sz="1800" kern="1200">
+                <a:solidFill>
+                  <a:schemeClr val="tx1"/>
+                </a:solidFill>
+                <a:latin typeface="+mn-lt"/>
+                <a:ea typeface="+mn-ea"/>
+                <a:cs typeface="+mn-cs"/>
+              </a:defRPr>
+            </a:lvl9pPr>
+          </a:lstStyle>
+          <a:p>
+            <a:pPr fontAlgn="base">
+              <a:buFontTx/>
+              <a:buChar char="-"/>
+            </a:pPr>
+            <a:r>
+              <a:rPr lang="en-US" sz="1400" dirty="0" smtClean="0"/>
+              <a:t>The database is at the base</a:t>
+            </a:r>
+            <a:endParaRPr lang="en-US" sz="1400" dirty="0" smtClean="0"/>
+          </a:p>
+          <a:p>
+            <a:pPr fontAlgn="base">
+              <a:buFontTx/>
+              <a:buChar char="-"/>
+            </a:pPr>
+            <a:r>
+              <a:rPr lang="en-US" sz="1400" dirty="0" smtClean="0"/>
+              <a:t>Databases are accessed by API calls</a:t>
+            </a:r>
+          </a:p>
+          <a:p>
+            <a:pPr fontAlgn="base">
+              <a:buFontTx/>
+              <a:buChar char="-"/>
+            </a:pPr>
+            <a:r>
+              <a:rPr lang="en-US" sz="1400" dirty="0" smtClean="0"/>
+              <a:t>An API gateway is defined to communicate with APIs</a:t>
+            </a:r>
+          </a:p>
+          <a:p>
+            <a:pPr fontAlgn="base">
+              <a:buFontTx/>
+              <a:buChar char="-"/>
+            </a:pPr>
+            <a:r>
+              <a:rPr lang="en-US" sz="1400" dirty="0" smtClean="0"/>
+              <a:t>The application or mobile app communicates with the API gateway to retrieve information</a:t>
+            </a:r>
+          </a:p>
+          <a:p>
+            <a:pPr fontAlgn="base">
+              <a:buFontTx/>
+              <a:buChar char="-"/>
+            </a:pPr>
+            <a:r>
+              <a:rPr lang="en-US" sz="1400" dirty="0" smtClean="0"/>
+              <a:t>Here a series of HTTP protocols take place</a:t>
+            </a:r>
+          </a:p>
+          <a:p>
+            <a:pPr fontAlgn="base">
+              <a:buFontTx/>
+              <a:buChar char="-"/>
+            </a:pPr>
+            <a:r>
+              <a:rPr lang="en-US" sz="1400" dirty="0" smtClean="0"/>
+              <a:t>Data is received and modified accordingly</a:t>
+            </a:r>
+            <a:r>
+              <a:rPr lang="en-US" sz="1400" dirty="0" smtClean="0"/>
+              <a:t/>
+            </a:r>
+            <a:br>
+              <a:rPr lang="en-US" sz="1400" dirty="0" smtClean="0"/>
+            </a:br>
+            <a:r>
+              <a:rPr lang="en-US" sz="1400" dirty="0" smtClean="0"/>
+              <a:t>	</a:t>
+            </a:r>
+            <a:endParaRPr lang="en-US" sz="1400" dirty="0"/>
           </a:p>
         </p:txBody>
       </p:sp>
@@ -7241,21 +8224,21 @@
 </file>
 
 <file path=customXml/item2.xml><?xml version="1.0" encoding="utf-8"?>
+<p:properties xmlns:p="http://schemas.microsoft.com/office/2006/metadata/properties" xmlns:xsi="http://www.w3.org/2001/XMLSchema-instance" xmlns:pc="http://schemas.microsoft.com/office/infopath/2007/PartnerControls">
+  <documentManagement>
+    <Status xmlns="71af3243-3dd4-4a8d-8c0d-dd76da1f02a5">Not started</Status>
+    <MediaServiceKeyPoints xmlns="71af3243-3dd4-4a8d-8c0d-dd76da1f02a5" xsi:nil="true"/>
+  </documentManagement>
+</p:properties>
+</file>
+
+<file path=customXml/item3.xml><?xml version="1.0" encoding="utf-8"?>
 <?mso-contentType ?>
 <FormTemplates xmlns="http://schemas.microsoft.com/sharepoint/v3/contenttype/forms">
   <Display>DocumentLibraryForm</Display>
   <Edit>DocumentLibraryForm</Edit>
   <New>DocumentLibraryForm</New>
 </FormTemplates>
-</file>
-
-<file path=customXml/item3.xml><?xml version="1.0" encoding="utf-8"?>
-<p:properties xmlns:p="http://schemas.microsoft.com/office/2006/metadata/properties" xmlns:xsi="http://www.w3.org/2001/XMLSchema-instance" xmlns:pc="http://schemas.microsoft.com/office/infopath/2007/PartnerControls">
-  <documentManagement>
-    <Status xmlns="71af3243-3dd4-4a8d-8c0d-dd76da1f02a5">Not started</Status>
-    <MediaServiceKeyPoints xmlns="71af3243-3dd4-4a8d-8c0d-dd76da1f02a5" xsi:nil="true"/>
-  </documentManagement>
-</p:properties>
 </file>
 
 <file path=customXml/itemProps1.xml><?xml version="1.0" encoding="utf-8"?>
@@ -7278,14 +8261,6 @@
 </file>
 
 <file path=customXml/itemProps2.xml><?xml version="1.0" encoding="utf-8"?>
-<ds:datastoreItem xmlns:ds="http://schemas.openxmlformats.org/officeDocument/2006/customXml" ds:itemID="{7EE8C63A-4744-4DE4-BB49-0FF0B5375C60}">
-  <ds:schemaRefs>
-    <ds:schemaRef ds:uri="http://schemas.microsoft.com/sharepoint/v3/contenttype/forms"/>
-  </ds:schemaRefs>
-</ds:datastoreItem>
-</file>
-
-<file path=customXml/itemProps3.xml><?xml version="1.0" encoding="utf-8"?>
 <ds:datastoreItem xmlns:ds="http://schemas.openxmlformats.org/officeDocument/2006/customXml" ds:itemID="{950072C5-DDE0-4258-BA7A-4D4B80DFA632}">
   <ds:schemaRefs>
     <ds:schemaRef ds:uri="http://purl.org/dc/terms/"/>
@@ -7300,4 +8275,12 @@
     <ds:schemaRef ds:uri="http://purl.org/dc/dcmitype/"/>
   </ds:schemaRefs>
 </ds:datastoreItem>
+</file>
+
+<file path=customXml/itemProps3.xml><?xml version="1.0" encoding="utf-8"?>
+<ds:datastoreItem xmlns:ds="http://schemas.openxmlformats.org/officeDocument/2006/customXml" ds:itemID="{7EE8C63A-4744-4DE4-BB49-0FF0B5375C60}">
+  <ds:schemaRefs>
+    <ds:schemaRef ds:uri="http://schemas.microsoft.com/sharepoint/v3/contenttype/forms"/>
+  </ds:schemaRefs>
+</ds:datastoreItem>
 </file>
</xml_diff>